<commit_message>
changes in ppt and research paper
</commit_message>
<xml_diff>
--- a/data-science-and-cardiovascular-diseases-cvds.pptx
+++ b/data-science-and-cardiovascular-diseases-cvds.pptx
@@ -6499,7 +6499,7 @@
                 <a:ea typeface="Arial Unicode MS" panose="020B0604020202020204" charset="-122"/>
                 <a:cs typeface="Arial Regular" panose="020B0604020202020204" charset="0"/>
               </a:rPr>
-              <a:t>Cardiovascular diseases (CVDs) are a group of disorders of the heart and blood vessels and they include:</a:t>
+              <a:t>Cardiovascular diseases (CVDs) heart and blood vessels diseaseswhich include:</a:t>
             </a:r>
             <a:endParaRPr lang="en-US" sz="1600">
               <a:solidFill>
@@ -6513,9 +6513,19 @@
             </a:endParaRPr>
           </a:p>
           <a:p>
-            <a:pPr marL="0" indent="0">
-              <a:buNone/>
-            </a:pPr>
+            <a:r>
+              <a:rPr lang="en-US" sz="1600">
+                <a:solidFill>
+                  <a:schemeClr val="tx1"/>
+                </a:solidFill>
+                <a:effectLst/>
+                <a:uFillTx/>
+                <a:latin typeface="Arial Regular" panose="020B0604020202020204" charset="0"/>
+                <a:ea typeface="Arial Unicode MS" panose="020B0604020202020204" charset="-122"/>
+                <a:cs typeface="Arial Regular" panose="020B0604020202020204" charset="0"/>
+              </a:rPr>
+              <a:t>Coronary heart disease </a:t>
+            </a:r>
             <a:endParaRPr lang="en-US" sz="1600">
               <a:solidFill>
                 <a:schemeClr val="tx1"/>
@@ -6539,7 +6549,7 @@
                 <a:ea typeface="Arial Unicode MS" panose="020B0604020202020204" charset="-122"/>
                 <a:cs typeface="Arial Regular" panose="020B0604020202020204" charset="0"/>
               </a:rPr>
-              <a:t>Coronary heart disease </a:t>
+              <a:t>Peripheral arterial disease </a:t>
             </a:r>
             <a:endParaRPr lang="en-US" sz="1600">
               <a:solidFill>
@@ -6563,8 +6573,36 @@
                 <a:latin typeface="Arial Regular" panose="020B0604020202020204" charset="0"/>
                 <a:ea typeface="Arial Unicode MS" panose="020B0604020202020204" charset="-122"/>
                 <a:cs typeface="Arial Regular" panose="020B0604020202020204" charset="0"/>
+                <a:sym typeface="+mn-ea"/>
               </a:rPr>
               <a:t>Cerebrovascular disease</a:t>
+            </a:r>
+            <a:endParaRPr lang="en-US" sz="1600">
+              <a:solidFill>
+                <a:schemeClr val="tx1"/>
+              </a:solidFill>
+              <a:effectLst/>
+              <a:uFillTx/>
+              <a:latin typeface="Arial Regular" panose="020B0604020202020204" charset="0"/>
+              <a:ea typeface="Arial Unicode MS" panose="020B0604020202020204" charset="-122"/>
+              <a:cs typeface="Arial Regular" panose="020B0604020202020204" charset="0"/>
+              <a:sym typeface="+mn-ea"/>
+            </a:endParaRPr>
+          </a:p>
+          <a:p>
+            <a:r>
+              <a:rPr lang="en-US" sz="1600">
+                <a:solidFill>
+                  <a:schemeClr val="tx1"/>
+                </a:solidFill>
+                <a:effectLst/>
+                <a:uFillTx/>
+                <a:latin typeface="Arial Regular" panose="020B0604020202020204" charset="0"/>
+                <a:ea typeface="Arial Unicode MS" panose="020B0604020202020204" charset="-122"/>
+                <a:cs typeface="Arial Regular" panose="020B0604020202020204" charset="0"/>
+                <a:sym typeface="+mn-ea"/>
+              </a:rPr>
+              <a:t>Congenital heart disease </a:t>
             </a:r>
             <a:endParaRPr lang="en-US" sz="1600">
               <a:solidFill>
@@ -6589,7 +6627,7 @@
                 <a:ea typeface="Arial Unicode MS" panose="020B0604020202020204" charset="-122"/>
                 <a:cs typeface="Arial Regular" panose="020B0604020202020204" charset="0"/>
               </a:rPr>
-              <a:t>Peripheral arterial disease </a:t>
+              <a:t>Rheumatic heart disease</a:t>
             </a:r>
             <a:endParaRPr lang="en-US" sz="1600">
               <a:solidFill>
@@ -6603,44 +6641,6 @@
             </a:endParaRPr>
           </a:p>
           <a:p>
-            <a:r>
-              <a:rPr lang="en-US" sz="1600">
-                <a:solidFill>
-                  <a:schemeClr val="tx1"/>
-                </a:solidFill>
-                <a:effectLst/>
-                <a:uFillTx/>
-                <a:latin typeface="Arial Regular" panose="020B0604020202020204" charset="0"/>
-                <a:ea typeface="Arial Unicode MS" panose="020B0604020202020204" charset="-122"/>
-                <a:cs typeface="Arial Regular" panose="020B0604020202020204" charset="0"/>
-              </a:rPr>
-              <a:t>Rheumatic heart disease</a:t>
-            </a:r>
-            <a:endParaRPr lang="en-US" sz="1600">
-              <a:solidFill>
-                <a:schemeClr val="tx1"/>
-              </a:solidFill>
-              <a:effectLst/>
-              <a:uFillTx/>
-              <a:latin typeface="Arial Regular" panose="020B0604020202020204" charset="0"/>
-              <a:ea typeface="Arial Unicode MS" panose="020B0604020202020204" charset="-122"/>
-              <a:cs typeface="Arial Regular" panose="020B0604020202020204" charset="0"/>
-            </a:endParaRPr>
-          </a:p>
-          <a:p>
-            <a:r>
-              <a:rPr lang="en-US" sz="1600">
-                <a:solidFill>
-                  <a:schemeClr val="tx1"/>
-                </a:solidFill>
-                <a:effectLst/>
-                <a:uFillTx/>
-                <a:latin typeface="Arial Regular" panose="020B0604020202020204" charset="0"/>
-                <a:ea typeface="Arial Unicode MS" panose="020B0604020202020204" charset="-122"/>
-                <a:cs typeface="Arial Regular" panose="020B0604020202020204" charset="0"/>
-              </a:rPr>
-              <a:t>Congenital heart disease Deep vein thrombosis and pulmonary embolism </a:t>
-            </a:r>
             <a:endParaRPr lang="en-US" sz="1600">
               <a:solidFill>
                 <a:schemeClr val="tx1"/>
@@ -6703,7 +6703,7 @@
         <p:spPr>
           <a:xfrm>
             <a:off x="467995" y="1828800"/>
-            <a:ext cx="11478895" cy="3538220"/>
+            <a:ext cx="11478895" cy="4523105"/>
           </a:xfrm>
           <a:prstGeom prst="rect">
             <a:avLst/>
@@ -6724,7 +6724,7 @@
                 <a:latin typeface="Arial Regular" panose="020B0604020202020204" charset="0"/>
                 <a:cs typeface="Arial Regular" panose="020B0604020202020204" charset="0"/>
               </a:rPr>
-              <a:t>CVDs are the number 1 cause of death globally</a:t>
+              <a:t>Many people die annually from CVDs than from any other cause. An estimated 17.9 million people died from CVDs in 2021, which would be 31% of all global deaths. A total of 85% is due to heart attack and stroke.</a:t>
             </a:r>
             <a:endParaRPr lang="en-US" sz="1600">
               <a:solidFill>
@@ -6832,51 +6832,7 @@
                 <a:cs typeface="Arial Regular" panose="020B0604020202020204" charset="0"/>
                 <a:sym typeface="+mn-ea"/>
               </a:rPr>
-              <a:t>id : It's just the Id no of the row. Not revelant </a:t>
-            </a:r>
-            <a:endParaRPr lang="en-US" sz="1600">
-              <a:solidFill>
-                <a:schemeClr val="tx1"/>
-              </a:solidFill>
-              <a:effectLst/>
-              <a:latin typeface="Arial Regular" panose="020B0604020202020204" charset="0"/>
-              <a:cs typeface="Arial Regular" panose="020B0604020202020204" charset="0"/>
-            </a:endParaRPr>
-          </a:p>
-          <a:p>
-            <a:r>
-              <a:rPr lang="en-US" sz="1600">
-                <a:solidFill>
-                  <a:schemeClr val="tx1"/>
-                </a:solidFill>
-                <a:effectLst/>
-                <a:latin typeface="Arial Regular" panose="020B0604020202020204" charset="0"/>
-                <a:cs typeface="Arial Regular" panose="020B0604020202020204" charset="0"/>
-                <a:sym typeface="+mn-ea"/>
-              </a:rPr>
-              <a:t>age : It's the age of a person in Days</a:t>
-            </a:r>
-            <a:endParaRPr lang="en-US" sz="1600">
-              <a:solidFill>
-                <a:schemeClr val="tx1"/>
-              </a:solidFill>
-              <a:effectLst/>
-              <a:latin typeface="Arial Regular" panose="020B0604020202020204" charset="0"/>
-              <a:cs typeface="Arial Regular" panose="020B0604020202020204" charset="0"/>
-            </a:endParaRPr>
-          </a:p>
-          <a:p>
-            <a:r>
-              <a:rPr lang="en-US" sz="1600">
-                <a:solidFill>
-                  <a:schemeClr val="tx1"/>
-                </a:solidFill>
-                <a:effectLst/>
-                <a:latin typeface="Arial Regular" panose="020B0604020202020204" charset="0"/>
-                <a:cs typeface="Arial Regular" panose="020B0604020202020204" charset="0"/>
-                <a:sym typeface="+mn-ea"/>
-              </a:rPr>
-              <a:t>gender : It's the gender of the person</a:t>
+              <a:t>id:special ID number</a:t>
             </a:r>
             <a:endParaRPr lang="en-US" sz="1600">
               <a:solidFill>
@@ -6889,18 +6845,6 @@
             </a:endParaRPr>
           </a:p>
           <a:p>
-            <a:r>
-              <a:rPr lang="en-US" sz="1600">
-                <a:solidFill>
-                  <a:schemeClr val="tx1"/>
-                </a:solidFill>
-                <a:effectLst/>
-                <a:latin typeface="Arial Regular" panose="020B0604020202020204" charset="0"/>
-                <a:cs typeface="Arial Regular" panose="020B0604020202020204" charset="0"/>
-                <a:sym typeface="+mn-ea"/>
-              </a:rPr>
-              <a:t>height : It's the height of the person in cm</a:t>
-            </a:r>
             <a:endParaRPr lang="en-US" sz="1600">
               <a:solidFill>
                 <a:schemeClr val="tx1"/>
@@ -6921,7 +6865,7 @@
                 <a:cs typeface="Arial Regular" panose="020B0604020202020204" charset="0"/>
                 <a:sym typeface="+mn-ea"/>
               </a:rPr>
-              <a:t>weight : It's the weight of the person in kg</a:t>
+              <a:t>gender:gender of an individual</a:t>
             </a:r>
             <a:endParaRPr lang="en-US" sz="1600">
               <a:solidFill>
@@ -6934,18 +6878,89 @@
             </a:endParaRPr>
           </a:p>
           <a:p>
+            <a:endParaRPr lang="en-US" sz="1600">
+              <a:solidFill>
+                <a:schemeClr val="tx1"/>
+              </a:solidFill>
+              <a:effectLst/>
+              <a:latin typeface="Arial Regular" panose="020B0604020202020204" charset="0"/>
+              <a:cs typeface="Arial Regular" panose="020B0604020202020204" charset="0"/>
+              <a:sym typeface="+mn-ea"/>
+            </a:endParaRPr>
+          </a:p>
+          <a:p>
             <a:r>
               <a:rPr lang="en-US" sz="1600">
-                <a:solidFill>
-                  <a:schemeClr val="tx1"/>
-                </a:solidFill>
                 <a:effectLst/>
                 <a:latin typeface="Arial Regular" panose="020B0604020202020204" charset="0"/>
                 <a:cs typeface="Arial Regular" panose="020B0604020202020204" charset="0"/>
                 <a:sym typeface="+mn-ea"/>
               </a:rPr>
-              <a:t>ap_hi : It's the Systolic blood pressure i.e. Pressure exerted when Blood is ejected in arteries. Normal  value : 120mmhg or Below</a:t>
-            </a:r>
+              <a:t>age:age of an individual</a:t>
+            </a:r>
+            <a:endParaRPr lang="en-US" sz="1600">
+              <a:effectLst/>
+              <a:latin typeface="Arial Regular" panose="020B0604020202020204" charset="0"/>
+              <a:cs typeface="Arial Regular" panose="020B0604020202020204" charset="0"/>
+              <a:sym typeface="+mn-ea"/>
+            </a:endParaRPr>
+          </a:p>
+          <a:p>
+            <a:endParaRPr lang="en-US" sz="1600">
+              <a:solidFill>
+                <a:schemeClr val="tx1"/>
+              </a:solidFill>
+              <a:effectLst/>
+              <a:latin typeface="Arial Regular" panose="020B0604020202020204" charset="0"/>
+              <a:cs typeface="Arial Regular" panose="020B0604020202020204" charset="0"/>
+              <a:sym typeface="+mn-ea"/>
+            </a:endParaRPr>
+          </a:p>
+          <a:p>
+            <a:r>
+              <a:rPr lang="en-US" sz="1600">
+                <a:solidFill>
+                  <a:schemeClr val="tx1"/>
+                </a:solidFill>
+                <a:effectLst/>
+                <a:latin typeface="Arial Regular" panose="020B0604020202020204" charset="0"/>
+                <a:cs typeface="Arial Regular" panose="020B0604020202020204" charset="0"/>
+                <a:sym typeface="+mn-ea"/>
+              </a:rPr>
+              <a:t>height:height of an </a:t>
+            </a:r>
+            <a:r>
+              <a:rPr lang="en-US" sz="1600">
+                <a:effectLst/>
+                <a:latin typeface="Arial Regular" panose="020B0604020202020204" charset="0"/>
+                <a:cs typeface="Arial Regular" panose="020B0604020202020204" charset="0"/>
+                <a:sym typeface="+mn-ea"/>
+              </a:rPr>
+              <a:t>individual</a:t>
+            </a:r>
+            <a:r>
+              <a:rPr lang="en-US" sz="1600">
+                <a:solidFill>
+                  <a:schemeClr val="tx1"/>
+                </a:solidFill>
+                <a:effectLst/>
+                <a:latin typeface="Arial Regular" panose="020B0604020202020204" charset="0"/>
+                <a:cs typeface="Arial Regular" panose="020B0604020202020204" charset="0"/>
+                <a:sym typeface="+mn-ea"/>
+              </a:rPr>
+              <a:t> (cms)</a:t>
+            </a:r>
+            <a:endParaRPr lang="en-US" sz="1600">
+              <a:solidFill>
+                <a:schemeClr val="tx1"/>
+              </a:solidFill>
+              <a:effectLst/>
+              <a:latin typeface="Arial Regular" panose="020B0604020202020204" charset="0"/>
+              <a:cs typeface="Arial Regular" panose="020B0604020202020204" charset="0"/>
+              <a:sym typeface="+mn-ea"/>
+            </a:endParaRPr>
+          </a:p>
+          <a:p>
             <a:endParaRPr lang="en-US" sz="1600">
               <a:solidFill>
                 <a:schemeClr val="tx1"/>
@@ -6956,6 +6971,49 @@
             </a:endParaRPr>
           </a:p>
           <a:p>
+            <a:r>
+              <a:rPr lang="en-US" sz="1600">
+                <a:solidFill>
+                  <a:schemeClr val="tx1"/>
+                </a:solidFill>
+                <a:effectLst/>
+                <a:latin typeface="Arial Regular" panose="020B0604020202020204" charset="0"/>
+                <a:cs typeface="Arial Regular" panose="020B0604020202020204" charset="0"/>
+                <a:sym typeface="+mn-ea"/>
+              </a:rPr>
+              <a:t>ap_hi:Systolic blood pressure (120mmhg or less)</a:t>
+            </a:r>
+            <a:endParaRPr lang="en-US" sz="1600">
+              <a:solidFill>
+                <a:schemeClr val="tx1"/>
+              </a:solidFill>
+              <a:effectLst/>
+              <a:latin typeface="Arial Regular" panose="020B0604020202020204" charset="0"/>
+              <a:cs typeface="Arial Regular" panose="020B0604020202020204" charset="0"/>
+              <a:sym typeface="+mn-ea"/>
+            </a:endParaRPr>
+          </a:p>
+          <a:p>
+            <a:endParaRPr lang="en-US" sz="1600">
+              <a:solidFill>
+                <a:schemeClr val="tx1"/>
+              </a:solidFill>
+              <a:effectLst/>
+              <a:latin typeface="Arial Regular" panose="020B0604020202020204" charset="0"/>
+              <a:cs typeface="Arial Regular" panose="020B0604020202020204" charset="0"/>
+              <a:sym typeface="+mn-ea"/>
+            </a:endParaRPr>
+          </a:p>
+          <a:p>
+            <a:r>
+              <a:rPr lang="en-US" sz="1600">
+                <a:effectLst/>
+                <a:latin typeface="Arial Regular" panose="020B0604020202020204" charset="0"/>
+                <a:cs typeface="Arial Regular" panose="020B0604020202020204" charset="0"/>
+                <a:sym typeface="+mn-ea"/>
+              </a:rPr>
+              <a:t>weight:weigh of an individual (kg)</a:t>
+            </a:r>
             <a:endParaRPr lang="en-US" sz="1600">
               <a:solidFill>
                 <a:schemeClr val="tx1"/>
@@ -6994,7 +7052,7 @@
         <p:spPr>
           <a:xfrm>
             <a:off x="421005" y="1780540"/>
-            <a:ext cx="10930255" cy="5507990"/>
+            <a:ext cx="10930255" cy="4276725"/>
           </a:xfrm>
           <a:prstGeom prst="rect">
             <a:avLst/>
@@ -7006,18 +7064,6 @@
             <a:spAutoFit/>
           </a:bodyPr>
           <a:p>
-            <a:r>
-              <a:rPr lang="en-US" sz="1600">
-                <a:solidFill>
-                  <a:schemeClr val="tx1"/>
-                </a:solidFill>
-                <a:effectLst/>
-                <a:uFillTx/>
-                <a:latin typeface="Arial Regular" panose="020B0604020202020204" charset="0"/>
-                <a:cs typeface="Arial Regular" panose="020B0604020202020204" charset="0"/>
-              </a:rPr>
-              <a:t>ap_low : It's the Diastolic blood pressure i.e. Pressure exerted when Blood exerts between arteries and heartbeats. Normal Value : 80mmhg or Below</a:t>
-            </a:r>
             <a:endParaRPr lang="en-US" sz="1600">
               <a:solidFill>
                 <a:schemeClr val="tx1"/>
@@ -7029,6 +7075,18 @@
             </a:endParaRPr>
           </a:p>
           <a:p>
+            <a:r>
+              <a:rPr lang="en-US" sz="1600">
+                <a:solidFill>
+                  <a:schemeClr val="tx1"/>
+                </a:solidFill>
+                <a:effectLst/>
+                <a:uFillTx/>
+                <a:latin typeface="Arial Regular" panose="020B0604020202020204" charset="0"/>
+                <a:cs typeface="Arial Regular" panose="020B0604020202020204" charset="0"/>
+              </a:rPr>
+              <a:t>ap_low:Diastolic blood pressure</a:t>
+            </a:r>
             <a:endParaRPr lang="en-US" sz="1600">
               <a:solidFill>
                 <a:schemeClr val="tx1"/>
@@ -7040,18 +7098,6 @@
             </a:endParaRPr>
           </a:p>
           <a:p>
-            <a:r>
-              <a:rPr lang="en-US" sz="1600">
-                <a:solidFill>
-                  <a:schemeClr val="tx1"/>
-                </a:solidFill>
-                <a:effectLst/>
-                <a:uFillTx/>
-                <a:latin typeface="Arial Regular" panose="020B0604020202020204" charset="0"/>
-                <a:cs typeface="Arial Regular" panose="020B0604020202020204" charset="0"/>
-              </a:rPr>
-              <a:t>cholesterol : It's the Cholestreol value (Cholesterol is a type of fat found in your blood) of your blood. In Adults, 200 mg/dL is desired with 200 and 239 mg/dL as Boderline High. In Children, 170 mg/dL is desired with 170 and 199 mg/dL as Boderline High</a:t>
-            </a:r>
             <a:endParaRPr lang="en-US" sz="1600">
               <a:solidFill>
                 <a:schemeClr val="tx1"/>
@@ -7063,6 +7109,40 @@
             </a:endParaRPr>
           </a:p>
           <a:p>
+            <a:r>
+              <a:rPr lang="en-US" sz="1600">
+                <a:solidFill>
+                  <a:schemeClr val="tx1"/>
+                </a:solidFill>
+                <a:effectLst/>
+                <a:uFillTx/>
+                <a:latin typeface="Arial Regular" panose="020B0604020202020204" charset="0"/>
+                <a:cs typeface="Arial Regular" panose="020B0604020202020204" charset="0"/>
+              </a:rPr>
+              <a:t>cholesterol:Cholestreol value .</a:t>
+            </a:r>
+            <a:r>
+              <a:rPr lang="en-US" sz="1600">
+                <a:effectLst/>
+                <a:uFillTx/>
+                <a:latin typeface="Arial Regular" panose="020B0604020202020204" charset="0"/>
+                <a:cs typeface="Arial Regular" panose="020B0604020202020204" charset="0"/>
+                <a:sym typeface="+mn-ea"/>
+              </a:rPr>
+              <a:t>Cholestreol </a:t>
+            </a:r>
+            <a:r>
+              <a:rPr lang="en-US" sz="1600">
+                <a:solidFill>
+                  <a:schemeClr val="tx1"/>
+                </a:solidFill>
+                <a:effectLst/>
+                <a:uFillTx/>
+                <a:latin typeface="Arial Regular" panose="020B0604020202020204" charset="0"/>
+                <a:cs typeface="Arial Regular" panose="020B0604020202020204" charset="0"/>
+              </a:rPr>
+              <a:t>is type of fat found in your blood flow.Adults, 200 mg/dL is acceptable , 200 and 239 mg/dL as Boderline High</a:t>
+            </a:r>
             <a:endParaRPr lang="en-US" sz="1600">
               <a:solidFill>
                 <a:schemeClr val="tx1"/>
@@ -7074,18 +7154,6 @@
             </a:endParaRPr>
           </a:p>
           <a:p>
-            <a:r>
-              <a:rPr lang="en-US" sz="1600">
-                <a:solidFill>
-                  <a:schemeClr val="tx1"/>
-                </a:solidFill>
-                <a:effectLst/>
-                <a:uFillTx/>
-                <a:latin typeface="Arial Regular" panose="020B0604020202020204" charset="0"/>
-                <a:cs typeface="Arial Regular" panose="020B0604020202020204" charset="0"/>
-              </a:rPr>
-              <a:t>gluc : It's the Glucose Level. They're less than 100 mg/dL after not eating (fasting) for at least 8 hours. And they're less than 140 mg/dL 2 hours after eating. For most people without diabetes, blood sugar levels before meals hover around 70 to 80 mg/dL</a:t>
-            </a:r>
             <a:endParaRPr lang="en-US" sz="1600">
               <a:solidFill>
                 <a:schemeClr val="tx1"/>
@@ -7097,6 +7165,25 @@
             </a:endParaRPr>
           </a:p>
           <a:p>
+            <a:r>
+              <a:rPr lang="en-US" sz="1600">
+                <a:effectLst/>
+                <a:uFillTx/>
+                <a:latin typeface="Arial Regular" panose="020B0604020202020204" charset="0"/>
+                <a:cs typeface="Arial Regular" panose="020B0604020202020204" charset="0"/>
+                <a:sym typeface="+mn-ea"/>
+              </a:rPr>
+              <a:t>cardio:Target Value which is also Binary 0 - No cardiovascular disease found 1 - have cardiovascular disease.</a:t>
+            </a:r>
+            <a:endParaRPr lang="en-US" sz="1600">
+              <a:effectLst/>
+              <a:uFillTx/>
+              <a:latin typeface="Arial Regular" panose="020B0604020202020204" charset="0"/>
+              <a:cs typeface="Arial Regular" panose="020B0604020202020204" charset="0"/>
+              <a:sym typeface="+mn-ea"/>
+            </a:endParaRPr>
+          </a:p>
+          <a:p>
             <a:endParaRPr lang="en-US" sz="1600">
               <a:solidFill>
                 <a:schemeClr val="tx1"/>
@@ -7110,21 +7197,43 @@
           <a:p>
             <a:r>
               <a:rPr lang="en-US" sz="1600">
-                <a:solidFill>
-                  <a:schemeClr val="tx1"/>
-                </a:solidFill>
                 <a:effectLst/>
                 <a:uFillTx/>
                 <a:latin typeface="Arial Regular" panose="020B0604020202020204" charset="0"/>
                 <a:cs typeface="Arial Regular" panose="020B0604020202020204" charset="0"/>
                 <a:sym typeface="+mn-ea"/>
               </a:rPr>
-              <a:t>smoke : It contain Binary Values stating whether Person is a Smoker or not i.e.  {0 : 'Not a Smoker', 1 : 'Smoker'} </a:t>
+              <a:t>smoke:0 - non smoker. 1 - smoker.Binary value</a:t>
             </a:r>
             <a:endParaRPr lang="en-US" sz="1600">
-              <a:solidFill>
-                <a:schemeClr val="tx1"/>
-              </a:solidFill>
+              <a:effectLst/>
+              <a:uFillTx/>
+              <a:latin typeface="Arial Regular" panose="020B0604020202020204" charset="0"/>
+              <a:cs typeface="Arial Regular" panose="020B0604020202020204" charset="0"/>
+              <a:sym typeface="+mn-ea"/>
+            </a:endParaRPr>
+          </a:p>
+          <a:p>
+            <a:endParaRPr lang="en-US" sz="1600">
+              <a:effectLst/>
+              <a:uFillTx/>
+              <a:latin typeface="Arial Regular" panose="020B0604020202020204" charset="0"/>
+              <a:cs typeface="Arial Regular" panose="020B0604020202020204" charset="0"/>
+              <a:sym typeface="+mn-ea"/>
+            </a:endParaRPr>
+          </a:p>
+          <a:p>
+            <a:r>
+              <a:rPr lang="en-US" sz="1600">
+                <a:effectLst/>
+                <a:uFillTx/>
+                <a:latin typeface="Arial Regular" panose="020B0604020202020204" charset="0"/>
+                <a:cs typeface="Arial Regular" panose="020B0604020202020204" charset="0"/>
+                <a:sym typeface="+mn-ea"/>
+              </a:rPr>
+              <a:t>active:0 - not active physically. 1-active physically</a:t>
+            </a:r>
+            <a:endParaRPr lang="en-US" sz="1600">
               <a:effectLst/>
               <a:uFillTx/>
               <a:latin typeface="Arial Regular" panose="020B0604020202020204" charset="0"/>
@@ -7146,21 +7255,15 @@
           <a:p>
             <a:r>
               <a:rPr lang="en-US" sz="1600">
-                <a:solidFill>
-                  <a:schemeClr val="tx1"/>
-                </a:solidFill>
                 <a:effectLst/>
                 <a:uFillTx/>
                 <a:latin typeface="Arial Regular" panose="020B0604020202020204" charset="0"/>
                 <a:cs typeface="Arial Regular" panose="020B0604020202020204" charset="0"/>
                 <a:sym typeface="+mn-ea"/>
               </a:rPr>
-              <a:t>alco : It contain Binary Values stating whether Person is an alchoalic or not i.e.  {0 : 'Not a Alchoalic', 1 : 'Alcholic'} </a:t>
+              <a:t>alco:0 - non alcoholic. 1 - alcoholic.Binary value</a:t>
             </a:r>
             <a:endParaRPr lang="en-US" sz="1600">
-              <a:solidFill>
-                <a:schemeClr val="tx1"/>
-              </a:solidFill>
               <a:effectLst/>
               <a:uFillTx/>
               <a:latin typeface="Arial Regular" panose="020B0604020202020204" charset="0"/>
@@ -7189,55 +7292,25 @@
                 <a:uFillTx/>
                 <a:latin typeface="Arial Regular" panose="020B0604020202020204" charset="0"/>
                 <a:cs typeface="Arial Regular" panose="020B0604020202020204" charset="0"/>
-                <a:sym typeface="+mn-ea"/>
               </a:rPr>
-              <a:t>active : It contain Binary Values stating whether Person is involved in physical activites or not i.e.  {0 : 'Not involved in Physical Activites', 1 : 'involved in physical activites'} </a:t>
-            </a:r>
-            <a:endParaRPr lang="en-US" sz="1600">
-              <a:solidFill>
-                <a:schemeClr val="tx1"/>
-              </a:solidFill>
-              <a:effectLst/>
-              <a:uFillTx/>
-              <a:latin typeface="Arial Regular" panose="020B0604020202020204" charset="0"/>
-              <a:cs typeface="Arial Regular" panose="020B0604020202020204" charset="0"/>
-              <a:sym typeface="+mn-ea"/>
-            </a:endParaRPr>
-          </a:p>
-          <a:p>
-            <a:endParaRPr lang="en-US" sz="1600">
-              <a:solidFill>
-                <a:schemeClr val="tx1"/>
-              </a:solidFill>
-              <a:effectLst/>
-              <a:uFillTx/>
-              <a:latin typeface="Arial Regular" panose="020B0604020202020204" charset="0"/>
-              <a:cs typeface="Arial Regular" panose="020B0604020202020204" charset="0"/>
-              <a:sym typeface="+mn-ea"/>
-            </a:endParaRPr>
-          </a:p>
-          <a:p>
+              <a:t>gluc:Glucose Level. Individuals without diabetes Glucose level will range between </a:t>
+            </a:r>
             <a:r>
               <a:rPr lang="en-US" sz="1600">
-                <a:solidFill>
-                  <a:schemeClr val="tx1"/>
-                </a:solidFill>
                 <a:effectLst/>
                 <a:uFillTx/>
                 <a:latin typeface="Arial Regular" panose="020B0604020202020204" charset="0"/>
                 <a:cs typeface="Arial Regular" panose="020B0604020202020204" charset="0"/>
                 <a:sym typeface="+mn-ea"/>
               </a:rPr>
-              <a:t>cardio : It's our Target Value Binary Values stating whether Person can have Cardiovascular diseases (CVDs) or Not i.e.  {0 : 'Not Have CVD', 1 : 'Have CVD'} </a:t>
+              <a:t>around 70 to 80 mg/dL</a:t>
             </a:r>
             <a:endParaRPr lang="en-US" sz="1600">
-              <a:solidFill>
-                <a:schemeClr val="tx1"/>
-              </a:solidFill>
               <a:effectLst/>
               <a:uFillTx/>
               <a:latin typeface="Arial Regular" panose="020B0604020202020204" charset="0"/>
               <a:cs typeface="Arial Regular" panose="020B0604020202020204" charset="0"/>
+              <a:sym typeface="+mn-ea"/>
             </a:endParaRPr>
           </a:p>
           <a:p>

</xml_diff>